<commit_message>
included balancing and debugging and resources
</commit_message>
<xml_diff>
--- a/PsychoPy/iat/IAT_Example.pptx
+++ b/PsychoPy/iat/IAT_Example.pptx
@@ -12,7 +12,9 @@
     <p:sldId id="262" r:id="rId6"/>
     <p:sldId id="261" r:id="rId7"/>
     <p:sldId id="266" r:id="rId8"/>
-    <p:sldId id="264" r:id="rId9"/>
+    <p:sldId id="267" r:id="rId9"/>
+    <p:sldId id="269" r:id="rId10"/>
+    <p:sldId id="268" r:id="rId11"/>
   </p:sldIdLst>
   <p:sldSz cx="12192000" cy="6858000"/>
   <p:notesSz cx="6858000" cy="9144000"/>
@@ -277,7 +279,7 @@
           <a:p>
             <a:fld id="{D56CEA12-FB12-42B9-BE80-4A468B628E22}" type="datetimeFigureOut">
               <a:rPr lang="de-DE" smtClean="0"/>
-              <a:t>18.01.2021</a:t>
+              <a:t>25.01.2021</a:t>
             </a:fld>
             <a:endParaRPr lang="de-DE"/>
           </a:p>
@@ -475,7 +477,7 @@
           <a:p>
             <a:fld id="{D56CEA12-FB12-42B9-BE80-4A468B628E22}" type="datetimeFigureOut">
               <a:rPr lang="de-DE" smtClean="0"/>
-              <a:t>18.01.2021</a:t>
+              <a:t>25.01.2021</a:t>
             </a:fld>
             <a:endParaRPr lang="de-DE"/>
           </a:p>
@@ -683,7 +685,7 @@
           <a:p>
             <a:fld id="{D56CEA12-FB12-42B9-BE80-4A468B628E22}" type="datetimeFigureOut">
               <a:rPr lang="de-DE" smtClean="0"/>
-              <a:t>18.01.2021</a:t>
+              <a:t>25.01.2021</a:t>
             </a:fld>
             <a:endParaRPr lang="de-DE"/>
           </a:p>
@@ -881,7 +883,7 @@
           <a:p>
             <a:fld id="{D56CEA12-FB12-42B9-BE80-4A468B628E22}" type="datetimeFigureOut">
               <a:rPr lang="de-DE" smtClean="0"/>
-              <a:t>18.01.2021</a:t>
+              <a:t>25.01.2021</a:t>
             </a:fld>
             <a:endParaRPr lang="de-DE"/>
           </a:p>
@@ -1156,7 +1158,7 @@
           <a:p>
             <a:fld id="{D56CEA12-FB12-42B9-BE80-4A468B628E22}" type="datetimeFigureOut">
               <a:rPr lang="de-DE" smtClean="0"/>
-              <a:t>18.01.2021</a:t>
+              <a:t>25.01.2021</a:t>
             </a:fld>
             <a:endParaRPr lang="de-DE"/>
           </a:p>
@@ -1421,7 +1423,7 @@
           <a:p>
             <a:fld id="{D56CEA12-FB12-42B9-BE80-4A468B628E22}" type="datetimeFigureOut">
               <a:rPr lang="de-DE" smtClean="0"/>
-              <a:t>18.01.2021</a:t>
+              <a:t>25.01.2021</a:t>
             </a:fld>
             <a:endParaRPr lang="de-DE"/>
           </a:p>
@@ -1833,7 +1835,7 @@
           <a:p>
             <a:fld id="{D56CEA12-FB12-42B9-BE80-4A468B628E22}" type="datetimeFigureOut">
               <a:rPr lang="de-DE" smtClean="0"/>
-              <a:t>18.01.2021</a:t>
+              <a:t>25.01.2021</a:t>
             </a:fld>
             <a:endParaRPr lang="de-DE"/>
           </a:p>
@@ -1974,7 +1976,7 @@
           <a:p>
             <a:fld id="{D56CEA12-FB12-42B9-BE80-4A468B628E22}" type="datetimeFigureOut">
               <a:rPr lang="de-DE" smtClean="0"/>
-              <a:t>18.01.2021</a:t>
+              <a:t>25.01.2021</a:t>
             </a:fld>
             <a:endParaRPr lang="de-DE"/>
           </a:p>
@@ -2087,7 +2089,7 @@
           <a:p>
             <a:fld id="{D56CEA12-FB12-42B9-BE80-4A468B628E22}" type="datetimeFigureOut">
               <a:rPr lang="de-DE" smtClean="0"/>
-              <a:t>18.01.2021</a:t>
+              <a:t>25.01.2021</a:t>
             </a:fld>
             <a:endParaRPr lang="de-DE"/>
           </a:p>
@@ -2398,7 +2400,7 @@
           <a:p>
             <a:fld id="{D56CEA12-FB12-42B9-BE80-4A468B628E22}" type="datetimeFigureOut">
               <a:rPr lang="de-DE" smtClean="0"/>
-              <a:t>18.01.2021</a:t>
+              <a:t>25.01.2021</a:t>
             </a:fld>
             <a:endParaRPr lang="de-DE"/>
           </a:p>
@@ -2686,7 +2688,7 @@
           <a:p>
             <a:fld id="{D56CEA12-FB12-42B9-BE80-4A468B628E22}" type="datetimeFigureOut">
               <a:rPr lang="de-DE" smtClean="0"/>
-              <a:t>18.01.2021</a:t>
+              <a:t>25.01.2021</a:t>
             </a:fld>
             <a:endParaRPr lang="de-DE"/>
           </a:p>
@@ -2927,7 +2929,7 @@
           <a:p>
             <a:fld id="{D56CEA12-FB12-42B9-BE80-4A468B628E22}" type="datetimeFigureOut">
               <a:rPr lang="de-DE" smtClean="0"/>
-              <a:t>18.01.2021</a:t>
+              <a:t>25.01.2021</a:t>
             </a:fld>
             <a:endParaRPr lang="de-DE"/>
           </a:p>
@@ -3502,6 +3504,450 @@
     <p:extLst>
       <p:ext uri="{BB962C8B-B14F-4D97-AF65-F5344CB8AC3E}">
         <p14:creationId xmlns:p14="http://schemas.microsoft.com/office/powerpoint/2010/main" val="3860047545"/>
+      </p:ext>
+    </p:extLst>
+  </p:cSld>
+  <p:clrMapOvr>
+    <a:masterClrMapping/>
+  </p:clrMapOvr>
+</p:sld>
+</file>
+
+<file path=ppt/slides/slide10.xml><?xml version="1.0" encoding="utf-8"?>
+<p:sld xmlns:a="http://schemas.openxmlformats.org/drawingml/2006/main" xmlns:r="http://schemas.openxmlformats.org/officeDocument/2006/relationships" xmlns:p="http://schemas.openxmlformats.org/presentationml/2006/main">
+  <p:cSld>
+    <p:spTree>
+      <p:nvGrpSpPr>
+        <p:cNvPr id="1" name=""/>
+        <p:cNvGrpSpPr/>
+        <p:nvPr/>
+      </p:nvGrpSpPr>
+      <p:grpSpPr>
+        <a:xfrm>
+          <a:off x="0" y="0"/>
+          <a:ext cx="0" cy="0"/>
+          <a:chOff x="0" y="0"/>
+          <a:chExt cx="0" cy="0"/>
+        </a:xfrm>
+      </p:grpSpPr>
+      <p:sp>
+        <p:nvSpPr>
+          <p:cNvPr id="2" name="Titel 1">
+            <a:extLst>
+              <a:ext uri="{FF2B5EF4-FFF2-40B4-BE49-F238E27FC236}">
+                <a16:creationId xmlns:a16="http://schemas.microsoft.com/office/drawing/2014/main" id="{5783EC74-7895-4038-BD8E-4B0B08F09017}"/>
+              </a:ext>
+            </a:extLst>
+          </p:cNvPr>
+          <p:cNvSpPr>
+            <a:spLocks noGrp="1"/>
+          </p:cNvSpPr>
+          <p:nvPr>
+            <p:ph type="title"/>
+          </p:nvPr>
+        </p:nvSpPr>
+        <p:spPr/>
+        <p:txBody>
+          <a:bodyPr/>
+          <a:lstStyle/>
+          <a:p>
+            <a:r>
+              <a:rPr lang="de-DE" dirty="0"/>
+              <a:t>Debugging</a:t>
+            </a:r>
+          </a:p>
+        </p:txBody>
+      </p:sp>
+      <p:sp>
+        <p:nvSpPr>
+          <p:cNvPr id="3" name="Inhaltsplatzhalter 2">
+            <a:extLst>
+              <a:ext uri="{FF2B5EF4-FFF2-40B4-BE49-F238E27FC236}">
+                <a16:creationId xmlns:a16="http://schemas.microsoft.com/office/drawing/2014/main" id="{4847BB71-104C-474C-8DB6-8200C20FD1C7}"/>
+              </a:ext>
+            </a:extLst>
+          </p:cNvPr>
+          <p:cNvSpPr>
+            <a:spLocks noGrp="1"/>
+          </p:cNvSpPr>
+          <p:nvPr>
+            <p:ph idx="1"/>
+          </p:nvPr>
+        </p:nvSpPr>
+        <p:spPr/>
+        <p:txBody>
+          <a:bodyPr/>
+          <a:lstStyle/>
+          <a:p>
+            <a:r>
+              <a:rPr lang="de-DE" dirty="0"/>
+              <a:t>In </a:t>
+            </a:r>
+            <a:r>
+              <a:rPr lang="de-DE" dirty="0" err="1"/>
+              <a:t>Builder</a:t>
+            </a:r>
+            <a:r>
+              <a:rPr lang="de-DE" dirty="0"/>
+              <a:t>, </a:t>
+            </a:r>
+            <a:r>
+              <a:rPr lang="de-DE" dirty="0" err="1"/>
+              <a:t>you</a:t>
+            </a:r>
+            <a:r>
+              <a:rPr lang="de-DE" dirty="0"/>
+              <a:t> </a:t>
+            </a:r>
+            <a:r>
+              <a:rPr lang="de-DE" dirty="0" err="1"/>
+              <a:t>can</a:t>
+            </a:r>
+            <a:r>
+              <a:rPr lang="de-DE" dirty="0"/>
+              <a:t> </a:t>
+            </a:r>
+            <a:r>
+              <a:rPr lang="de-DE" dirty="0" err="1"/>
+              <a:t>disable</a:t>
+            </a:r>
+            <a:r>
+              <a:rPr lang="de-DE" dirty="0"/>
+              <a:t> code </a:t>
+            </a:r>
+            <a:r>
+              <a:rPr lang="de-DE" dirty="0" err="1"/>
+              <a:t>components</a:t>
+            </a:r>
+            <a:r>
+              <a:rPr lang="de-DE" dirty="0"/>
+              <a:t> </a:t>
+            </a:r>
+            <a:r>
+              <a:rPr lang="de-DE" dirty="0" err="1"/>
+              <a:t>to</a:t>
+            </a:r>
+            <a:r>
+              <a:rPr lang="de-DE" dirty="0"/>
+              <a:t> „</a:t>
+            </a:r>
+            <a:r>
+              <a:rPr lang="de-DE" dirty="0" err="1"/>
+              <a:t>speed</a:t>
+            </a:r>
+            <a:r>
+              <a:rPr lang="de-DE" dirty="0"/>
+              <a:t> </a:t>
+            </a:r>
+            <a:r>
+              <a:rPr lang="de-DE" dirty="0" err="1"/>
+              <a:t>up</a:t>
+            </a:r>
+            <a:r>
+              <a:rPr lang="de-DE" dirty="0"/>
+              <a:t>“ </a:t>
+            </a:r>
+            <a:r>
+              <a:rPr lang="de-DE" dirty="0" err="1"/>
+              <a:t>running</a:t>
+            </a:r>
+            <a:r>
+              <a:rPr lang="de-DE" dirty="0"/>
+              <a:t> time</a:t>
+            </a:r>
+          </a:p>
+          <a:p>
+            <a:r>
+              <a:rPr lang="de-DE" dirty="0" err="1"/>
+              <a:t>PsychoPy</a:t>
+            </a:r>
+            <a:r>
+              <a:rPr lang="de-DE" dirty="0"/>
+              <a:t>/Python: </a:t>
+            </a:r>
+            <a:r>
+              <a:rPr lang="de-DE" dirty="0" err="1">
+                <a:latin typeface="Courier New" panose="02070309020205020404" pitchFamily="49" charset="0"/>
+                <a:cs typeface="Courier New" panose="02070309020205020404" pitchFamily="49" charset="0"/>
+              </a:rPr>
+              <a:t>print</a:t>
+            </a:r>
+            <a:r>
+              <a:rPr lang="de-DE" dirty="0">
+                <a:latin typeface="Courier New" panose="02070309020205020404" pitchFamily="49" charset="0"/>
+                <a:cs typeface="Courier New" panose="02070309020205020404" pitchFamily="49" charset="0"/>
+              </a:rPr>
+              <a:t>() </a:t>
+            </a:r>
+            <a:r>
+              <a:rPr lang="de-DE" dirty="0" err="1"/>
+              <a:t>then</a:t>
+            </a:r>
+            <a:r>
+              <a:rPr lang="de-DE" dirty="0"/>
+              <a:t> check </a:t>
+            </a:r>
+            <a:r>
+              <a:rPr lang="de-DE" dirty="0" err="1"/>
+              <a:t>Stdout</a:t>
+            </a:r>
+            <a:r>
+              <a:rPr lang="de-DE" dirty="0"/>
+              <a:t> in </a:t>
+            </a:r>
+            <a:r>
+              <a:rPr lang="de-DE" dirty="0" err="1"/>
+              <a:t>runner</a:t>
+            </a:r>
+            <a:r>
+              <a:rPr lang="de-DE" dirty="0"/>
+              <a:t> </a:t>
+            </a:r>
+            <a:r>
+              <a:rPr lang="de-DE" dirty="0" err="1"/>
+              <a:t>view</a:t>
+            </a:r>
+            <a:endParaRPr lang="de-DE" dirty="0"/>
+          </a:p>
+          <a:p>
+            <a:r>
+              <a:rPr lang="de-DE" dirty="0" err="1"/>
+              <a:t>jsPsych</a:t>
+            </a:r>
+            <a:r>
+              <a:rPr lang="de-DE" dirty="0"/>
+              <a:t>/</a:t>
+            </a:r>
+            <a:r>
+              <a:rPr lang="de-DE" dirty="0" err="1"/>
+              <a:t>Pavlovia</a:t>
+            </a:r>
+            <a:r>
+              <a:rPr lang="de-DE" dirty="0"/>
+              <a:t>: </a:t>
+            </a:r>
+            <a:r>
+              <a:rPr lang="de-DE" dirty="0">
+                <a:latin typeface="Courier New" panose="02070309020205020404" pitchFamily="49" charset="0"/>
+                <a:cs typeface="Courier New" panose="02070309020205020404" pitchFamily="49" charset="0"/>
+              </a:rPr>
+              <a:t>console.log()</a:t>
+            </a:r>
+            <a:r>
+              <a:rPr lang="de-DE" dirty="0"/>
+              <a:t> </a:t>
+            </a:r>
+            <a:r>
+              <a:rPr lang="de-DE" dirty="0" err="1"/>
+              <a:t>then</a:t>
+            </a:r>
+            <a:r>
+              <a:rPr lang="de-DE" dirty="0"/>
+              <a:t> check </a:t>
+            </a:r>
+            <a:r>
+              <a:rPr lang="de-DE" dirty="0" err="1"/>
+              <a:t>developers</a:t>
+            </a:r>
+            <a:r>
+              <a:rPr lang="de-DE" dirty="0"/>
+              <a:t> </a:t>
+            </a:r>
+            <a:r>
+              <a:rPr lang="de-DE" dirty="0" err="1"/>
+              <a:t>tool</a:t>
+            </a:r>
+            <a:r>
+              <a:rPr lang="de-DE" dirty="0"/>
+              <a:t> (e.g. F12 in </a:t>
+            </a:r>
+            <a:r>
+              <a:rPr lang="de-DE" dirty="0" err="1"/>
+              <a:t>firefox</a:t>
+            </a:r>
+            <a:r>
+              <a:rPr lang="de-DE" dirty="0"/>
+              <a:t>, </a:t>
+            </a:r>
+            <a:r>
+              <a:rPr lang="de-DE" dirty="0" err="1"/>
+              <a:t>or</a:t>
+            </a:r>
+            <a:r>
+              <a:rPr lang="de-DE" dirty="0"/>
+              <a:t> </a:t>
+            </a:r>
+            <a:r>
+              <a:rPr lang="de-DE" dirty="0" err="1"/>
+              <a:t>right-click</a:t>
+            </a:r>
+            <a:r>
+              <a:rPr lang="de-DE" dirty="0"/>
+              <a:t> + „Element untersuchen“  </a:t>
+            </a:r>
+            <a:r>
+              <a:rPr lang="de-DE" dirty="0">
+                <a:sym typeface="Wingdings" panose="05000000000000000000" pitchFamily="2" charset="2"/>
+              </a:rPr>
+              <a:t> Konsole</a:t>
+            </a:r>
+            <a:endParaRPr lang="de-DE" dirty="0"/>
+          </a:p>
+          <a:p>
+            <a:pPr marL="0" indent="0">
+              <a:buNone/>
+            </a:pPr>
+            <a:endParaRPr lang="de-DE" dirty="0"/>
+          </a:p>
+          <a:p>
+            <a:r>
+              <a:rPr lang="de-DE" dirty="0" err="1"/>
+              <a:t>Changes</a:t>
+            </a:r>
+            <a:r>
+              <a:rPr lang="de-DE" dirty="0"/>
+              <a:t> in Experiment do not „</a:t>
+            </a:r>
+            <a:r>
+              <a:rPr lang="de-DE" dirty="0" err="1"/>
+              <a:t>show</a:t>
+            </a:r>
+            <a:r>
+              <a:rPr lang="de-DE" dirty="0"/>
+              <a:t> </a:t>
+            </a:r>
+            <a:r>
+              <a:rPr lang="de-DE" dirty="0" err="1"/>
+              <a:t>up</a:t>
+            </a:r>
+            <a:r>
+              <a:rPr lang="de-DE" dirty="0"/>
+              <a:t>“ online (</a:t>
+            </a:r>
+            <a:r>
+              <a:rPr lang="de-DE" dirty="0" err="1"/>
+              <a:t>even</a:t>
+            </a:r>
+            <a:r>
+              <a:rPr lang="de-DE" dirty="0"/>
+              <a:t> </a:t>
+            </a:r>
+            <a:r>
+              <a:rPr lang="de-DE" dirty="0" err="1"/>
+              <a:t>though</a:t>
+            </a:r>
+            <a:r>
+              <a:rPr lang="de-DE" dirty="0"/>
+              <a:t> „</a:t>
+            </a:r>
+            <a:r>
+              <a:rPr lang="de-DE" dirty="0" err="1"/>
+              <a:t>pushing</a:t>
+            </a:r>
+            <a:r>
+              <a:rPr lang="de-DE" dirty="0"/>
+              <a:t>“ </a:t>
+            </a:r>
+            <a:r>
+              <a:rPr lang="de-DE" dirty="0" err="1"/>
+              <a:t>worked</a:t>
+            </a:r>
+            <a:r>
+              <a:rPr lang="de-DE" dirty="0"/>
+              <a:t>)?  </a:t>
+            </a:r>
+            <a:r>
+              <a:rPr lang="de-DE" dirty="0">
+                <a:sym typeface="Wingdings" panose="05000000000000000000" pitchFamily="2" charset="2"/>
+              </a:rPr>
+              <a:t> </a:t>
+            </a:r>
+            <a:r>
+              <a:rPr lang="de-DE" dirty="0" err="1">
+                <a:sym typeface="Wingdings" panose="05000000000000000000" pitchFamily="2" charset="2"/>
+              </a:rPr>
+              <a:t>clear</a:t>
+            </a:r>
+            <a:r>
+              <a:rPr lang="de-DE" dirty="0">
+                <a:sym typeface="Wingdings" panose="05000000000000000000" pitchFamily="2" charset="2"/>
+              </a:rPr>
+              <a:t> </a:t>
+            </a:r>
+            <a:r>
+              <a:rPr lang="de-DE" dirty="0" err="1">
+                <a:sym typeface="Wingdings" panose="05000000000000000000" pitchFamily="2" charset="2"/>
+              </a:rPr>
+              <a:t>cache</a:t>
+            </a:r>
+            <a:r>
+              <a:rPr lang="de-DE" dirty="0">
+                <a:sym typeface="Wingdings" panose="05000000000000000000" pitchFamily="2" charset="2"/>
+              </a:rPr>
+              <a:t>, </a:t>
+            </a:r>
+            <a:r>
+              <a:rPr lang="de-DE" dirty="0" err="1">
+                <a:sym typeface="Wingdings" panose="05000000000000000000" pitchFamily="2" charset="2"/>
+              </a:rPr>
+              <a:t>refresh</a:t>
+            </a:r>
+            <a:r>
+              <a:rPr lang="de-DE" dirty="0">
+                <a:sym typeface="Wingdings" panose="05000000000000000000" pitchFamily="2" charset="2"/>
+              </a:rPr>
+              <a:t> </a:t>
+            </a:r>
+            <a:r>
+              <a:rPr lang="de-DE" dirty="0" err="1">
+                <a:sym typeface="Wingdings" panose="05000000000000000000" pitchFamily="2" charset="2"/>
+              </a:rPr>
+              <a:t>experiment</a:t>
+            </a:r>
+            <a:r>
+              <a:rPr lang="de-DE" dirty="0">
+                <a:sym typeface="Wingdings" panose="05000000000000000000" pitchFamily="2" charset="2"/>
+              </a:rPr>
+              <a:t> </a:t>
+            </a:r>
+            <a:r>
+              <a:rPr lang="de-DE" dirty="0" err="1">
+                <a:sym typeface="Wingdings" panose="05000000000000000000" pitchFamily="2" charset="2"/>
+              </a:rPr>
+              <a:t>page</a:t>
+            </a:r>
+            <a:r>
+              <a:rPr lang="de-DE" dirty="0">
+                <a:sym typeface="Wingdings" panose="05000000000000000000" pitchFamily="2" charset="2"/>
+              </a:rPr>
+              <a:t>!</a:t>
+            </a:r>
+            <a:endParaRPr lang="de-DE" dirty="0"/>
+          </a:p>
+          <a:p>
+            <a:endParaRPr lang="de-DE" dirty="0">
+              <a:latin typeface="Bahnschrift Light SemiCondensed" panose="020B0502040204020203" pitchFamily="34" charset="0"/>
+            </a:endParaRPr>
+          </a:p>
+          <a:p>
+            <a:endParaRPr lang="de-DE" dirty="0">
+              <a:latin typeface="Bahnschrift Light SemiCondensed" panose="020B0502040204020203" pitchFamily="34" charset="0"/>
+            </a:endParaRPr>
+          </a:p>
+          <a:p>
+            <a:pPr marL="0" indent="0">
+              <a:buNone/>
+            </a:pPr>
+            <a:endParaRPr lang="de-DE" dirty="0">
+              <a:latin typeface="Bahnschrift Light SemiCondensed" panose="020B0502040204020203" pitchFamily="34" charset="0"/>
+            </a:endParaRPr>
+          </a:p>
+        </p:txBody>
+      </p:sp>
+    </p:spTree>
+    <p:extLst>
+      <p:ext uri="{BB962C8B-B14F-4D97-AF65-F5344CB8AC3E}">
+        <p14:creationId xmlns:p14="http://schemas.microsoft.com/office/powerpoint/2010/main" val="1288043096"/>
       </p:ext>
     </p:extLst>
   </p:cSld>
@@ -8623,7 +9069,7 @@
           <p:cNvPr id="2" name="Titel 1">
             <a:extLst>
               <a:ext uri="{FF2B5EF4-FFF2-40B4-BE49-F238E27FC236}">
-                <a16:creationId xmlns:a16="http://schemas.microsoft.com/office/drawing/2014/main" id="{EDD0820B-AE6D-43FE-8147-4E85AFE9FBCD}"/>
+                <a16:creationId xmlns:a16="http://schemas.microsoft.com/office/drawing/2014/main" id="{B05721E2-6C9F-4DC1-9D1B-01EA714F1538}"/>
               </a:ext>
             </a:extLst>
           </p:cNvPr>
@@ -8640,13 +9086,9 @@
           <a:lstStyle/>
           <a:p>
             <a:r>
-              <a:rPr lang="en-GB" dirty="0"/>
-              <a:t>“Homework” </a:t>
-            </a:r>
-            <a:br>
-              <a:rPr lang="de-DE" dirty="0"/>
-            </a:br>
-            <a:endParaRPr lang="de-DE" dirty="0"/>
+              <a:rPr lang="de-DE" dirty="0"/>
+              <a:t>Resources</a:t>
+            </a:r>
           </a:p>
         </p:txBody>
       </p:sp>
@@ -8655,7 +9097,7 @@
           <p:cNvPr id="3" name="Inhaltsplatzhalter 2">
             <a:extLst>
               <a:ext uri="{FF2B5EF4-FFF2-40B4-BE49-F238E27FC236}">
-                <a16:creationId xmlns:a16="http://schemas.microsoft.com/office/drawing/2014/main" id="{5E8427F5-EBEB-4583-8FC3-EB516321CF2A}"/>
+                <a16:creationId xmlns:a16="http://schemas.microsoft.com/office/drawing/2014/main" id="{96575890-C1BE-4F97-B0B7-54A1B9A71285}"/>
               </a:ext>
             </a:extLst>
           </p:cNvPr>
@@ -8668,25 +9110,99 @@
         </p:nvSpPr>
         <p:spPr/>
         <p:txBody>
-          <a:bodyPr/>
+          <a:bodyPr>
+            <a:normAutofit/>
+          </a:bodyPr>
           <a:lstStyle/>
           <a:p>
             <a:pPr lvl="0"/>
             <a:r>
+              <a:rPr lang="en-GB" b="1" dirty="0"/>
+              <a:t>Getting started: </a:t>
+            </a:r>
+            <a:r>
+              <a:rPr lang="en-GB" b="1" dirty="0">
+                <a:hlinkClick r:id="rId2"/>
+              </a:rPr>
+              <a:t>https://www.psychopy.org/online/index.html</a:t>
+            </a:r>
+            <a:endParaRPr lang="en-GB" b="1" dirty="0"/>
+          </a:p>
+          <a:p>
+            <a:pPr lvl="0"/>
+            <a:r>
+              <a:rPr lang="en-GB" b="1" dirty="0" err="1"/>
+              <a:t>PsychoPy</a:t>
+            </a:r>
+            <a:r>
+              <a:rPr lang="en-GB" b="1" dirty="0"/>
+              <a:t> Forum:   </a:t>
+            </a:r>
+            <a:r>
+              <a:rPr lang="en-GB" b="1" u="sng" dirty="0">
+                <a:hlinkClick r:id="rId3"/>
+              </a:rPr>
+              <a:t>https://discourse.psychopy.org/</a:t>
+            </a:r>
+            <a:endParaRPr lang="en-GB" b="1" u="sng" dirty="0"/>
+          </a:p>
+          <a:p>
+            <a:r>
+              <a:rPr lang="en-GB" b="1" dirty="0" err="1"/>
+              <a:t>Github</a:t>
+            </a:r>
+            <a:r>
+              <a:rPr lang="en-GB" b="1" dirty="0"/>
+              <a:t> issues:</a:t>
+            </a:r>
+            <a:r>
               <a:rPr lang="en-GB" dirty="0"/>
-              <a:t>follow through these steps</a:t>
+              <a:t> </a:t>
+            </a:r>
+            <a:r>
+              <a:rPr lang="en-GB" u="sng" dirty="0">
+                <a:hlinkClick r:id="rId4"/>
+              </a:rPr>
+              <a:t>https://github.com/psychopy/psychopy/issues</a:t>
             </a:r>
             <a:endParaRPr lang="de-DE" dirty="0"/>
           </a:p>
           <a:p>
             <a:pPr lvl="0"/>
-            <a:r>
-              <a:rPr lang="en-GB" dirty="0"/>
-              <a:t>change the experiment to present pictures of the creatures instead of “creature words” </a:t>
-            </a:r>
             <a:endParaRPr lang="de-DE" dirty="0"/>
           </a:p>
           <a:p>
+            <a:pPr lvl="0"/>
+            <a:r>
+              <a:rPr lang="en-GB" b="1" dirty="0"/>
+              <a:t>CRIB SHEET for getting </a:t>
+            </a:r>
+            <a:r>
+              <a:rPr lang="en-GB" b="1" dirty="0" err="1"/>
+              <a:t>psychopy</a:t>
+            </a:r>
+            <a:r>
+              <a:rPr lang="en-GB" b="1" dirty="0"/>
+              <a:t> Experiments online:</a:t>
+            </a:r>
+            <a:endParaRPr lang="de-DE" dirty="0"/>
+          </a:p>
+          <a:p>
+            <a:pPr marL="0" indent="0">
+              <a:buNone/>
+            </a:pPr>
+            <a:r>
+              <a:rPr lang="en-GB" u="sng" dirty="0">
+                <a:hlinkClick r:id="rId5"/>
+              </a:rPr>
+              <a:t>https://docs.google.com/document/d/13jp0QAqQeFlYSjeZS0fDInvgaDzBXjGQNe4VNKbbNHQ/edit</a:t>
+            </a:r>
+            <a:endParaRPr lang="de-DE" dirty="0"/>
+          </a:p>
+          <a:p>
+            <a:pPr marL="0" indent="0">
+              <a:buNone/>
+            </a:pPr>
             <a:endParaRPr lang="de-DE" dirty="0"/>
           </a:p>
         </p:txBody>
@@ -8694,7 +9210,591 @@
     </p:spTree>
     <p:extLst>
       <p:ext uri="{BB962C8B-B14F-4D97-AF65-F5344CB8AC3E}">
-        <p14:creationId xmlns:p14="http://schemas.microsoft.com/office/powerpoint/2010/main" val="2208623877"/>
+        <p14:creationId xmlns:p14="http://schemas.microsoft.com/office/powerpoint/2010/main" val="1764143971"/>
+      </p:ext>
+    </p:extLst>
+  </p:cSld>
+  <p:clrMapOvr>
+    <a:masterClrMapping/>
+  </p:clrMapOvr>
+</p:sld>
+</file>
+
+<file path=ppt/slides/slide9.xml><?xml version="1.0" encoding="utf-8"?>
+<p:sld xmlns:a="http://schemas.openxmlformats.org/drawingml/2006/main" xmlns:r="http://schemas.openxmlformats.org/officeDocument/2006/relationships" xmlns:p="http://schemas.openxmlformats.org/presentationml/2006/main">
+  <p:cSld>
+    <p:spTree>
+      <p:nvGrpSpPr>
+        <p:cNvPr id="1" name=""/>
+        <p:cNvGrpSpPr/>
+        <p:nvPr/>
+      </p:nvGrpSpPr>
+      <p:grpSpPr>
+        <a:xfrm>
+          <a:off x="0" y="0"/>
+          <a:ext cx="0" cy="0"/>
+          <a:chOff x="0" y="0"/>
+          <a:chExt cx="0" cy="0"/>
+        </a:xfrm>
+      </p:grpSpPr>
+      <p:sp>
+        <p:nvSpPr>
+          <p:cNvPr id="2" name="Titel 1">
+            <a:extLst>
+              <a:ext uri="{FF2B5EF4-FFF2-40B4-BE49-F238E27FC236}">
+                <a16:creationId xmlns:a16="http://schemas.microsoft.com/office/drawing/2014/main" id="{871A299C-634C-44BC-9A90-650658025F81}"/>
+              </a:ext>
+            </a:extLst>
+          </p:cNvPr>
+          <p:cNvSpPr>
+            <a:spLocks noGrp="1"/>
+          </p:cNvSpPr>
+          <p:nvPr>
+            <p:ph type="title"/>
+          </p:nvPr>
+        </p:nvSpPr>
+        <p:spPr/>
+        <p:txBody>
+          <a:bodyPr/>
+          <a:lstStyle/>
+          <a:p>
+            <a:r>
+              <a:rPr lang="de-DE" dirty="0" err="1"/>
+              <a:t>Balancing</a:t>
+            </a:r>
+            <a:r>
+              <a:rPr lang="de-DE" dirty="0"/>
+              <a:t> online </a:t>
+            </a:r>
+            <a:r>
+              <a:rPr lang="de-DE" dirty="0" err="1"/>
+              <a:t>studies</a:t>
+            </a:r>
+            <a:endParaRPr lang="de-DE" dirty="0"/>
+          </a:p>
+        </p:txBody>
+      </p:sp>
+      <p:sp>
+        <p:nvSpPr>
+          <p:cNvPr id="3" name="Inhaltsplatzhalter 2">
+            <a:extLst>
+              <a:ext uri="{FF2B5EF4-FFF2-40B4-BE49-F238E27FC236}">
+                <a16:creationId xmlns:a16="http://schemas.microsoft.com/office/drawing/2014/main" id="{57B5DB21-BB77-484E-88B6-ACF607A86D1A}"/>
+              </a:ext>
+            </a:extLst>
+          </p:cNvPr>
+          <p:cNvSpPr>
+            <a:spLocks noGrp="1"/>
+          </p:cNvSpPr>
+          <p:nvPr>
+            <p:ph idx="1"/>
+          </p:nvPr>
+        </p:nvSpPr>
+        <p:spPr>
+          <a:xfrm>
+            <a:off x="838200" y="1587260"/>
+            <a:ext cx="10515600" cy="4905615"/>
+          </a:xfrm>
+        </p:spPr>
+        <p:txBody>
+          <a:bodyPr>
+            <a:normAutofit fontScale="92500" lnSpcReduction="10000"/>
+          </a:bodyPr>
+          <a:lstStyle/>
+          <a:p>
+            <a:pPr marL="0" indent="0">
+              <a:buNone/>
+            </a:pPr>
+            <a:r>
+              <a:rPr lang="de-DE" u="sng" dirty="0">
+                <a:hlinkClick r:id="rId2"/>
+              </a:rPr>
+              <a:t>https://moryscarter.com/vespr/pavlovia.php</a:t>
+            </a:r>
+            <a:endParaRPr lang="de-DE" u="sng" dirty="0"/>
+          </a:p>
+          <a:p>
+            <a:pPr marL="0" indent="0">
+              <a:buNone/>
+            </a:pPr>
+            <a:r>
+              <a:rPr lang="de-DE" dirty="0" err="1"/>
+              <a:t>Assigns</a:t>
+            </a:r>
+            <a:r>
+              <a:rPr lang="de-DE" dirty="0"/>
+              <a:t> </a:t>
+            </a:r>
+            <a:r>
+              <a:rPr lang="de-DE" dirty="0" err="1"/>
+              <a:t>consequtive</a:t>
+            </a:r>
+            <a:r>
+              <a:rPr lang="de-DE" dirty="0"/>
+              <a:t> </a:t>
+            </a:r>
+            <a:r>
+              <a:rPr lang="de-DE" dirty="0" err="1"/>
+              <a:t>participant</a:t>
+            </a:r>
+            <a:r>
+              <a:rPr lang="de-DE" dirty="0"/>
+              <a:t> </a:t>
+            </a:r>
+            <a:r>
+              <a:rPr lang="de-DE" dirty="0" err="1"/>
+              <a:t>numbers</a:t>
+            </a:r>
+            <a:r>
+              <a:rPr lang="de-DE" dirty="0"/>
+              <a:t> (1,2,3,4,…, </a:t>
+            </a:r>
+            <a:r>
+              <a:rPr lang="de-DE" dirty="0" err="1"/>
+              <a:t>each</a:t>
+            </a:r>
+            <a:r>
+              <a:rPr lang="de-DE" dirty="0"/>
+              <a:t> time </a:t>
+            </a:r>
+            <a:r>
+              <a:rPr lang="de-DE" dirty="0" err="1"/>
+              <a:t>the</a:t>
+            </a:r>
+            <a:r>
+              <a:rPr lang="de-DE" dirty="0"/>
+              <a:t> link </a:t>
+            </a:r>
+            <a:r>
+              <a:rPr lang="de-DE" dirty="0" err="1"/>
+              <a:t>is</a:t>
+            </a:r>
+            <a:r>
+              <a:rPr lang="de-DE" dirty="0"/>
+              <a:t> </a:t>
+            </a:r>
+            <a:r>
+              <a:rPr lang="de-DE" dirty="0" err="1"/>
+              <a:t>used</a:t>
+            </a:r>
+            <a:r>
+              <a:rPr lang="de-DE" dirty="0"/>
+              <a:t>)</a:t>
+            </a:r>
+          </a:p>
+          <a:p>
+            <a:pPr marL="0" indent="0">
+              <a:buNone/>
+            </a:pPr>
+            <a:r>
+              <a:rPr lang="de-DE" i="1" dirty="0" err="1"/>
+              <a:t>Example</a:t>
+            </a:r>
+            <a:r>
+              <a:rPr lang="de-DE" i="1" dirty="0"/>
+              <a:t>: </a:t>
+            </a:r>
+            <a:endParaRPr lang="de-DE" i="1" dirty="0">
+              <a:hlinkClick r:id="rId3"/>
+            </a:endParaRPr>
+          </a:p>
+          <a:p>
+            <a:pPr marL="0" indent="0">
+              <a:buNone/>
+            </a:pPr>
+            <a:r>
+              <a:rPr lang="de-DE" dirty="0"/>
+              <a:t>Original url: </a:t>
+            </a:r>
+            <a:r>
+              <a:rPr lang="de-DE" dirty="0">
+                <a:hlinkClick r:id="rId4"/>
+              </a:rPr>
+              <a:t>https://pavlovia.org/run/KarinBausenhart/iatexample</a:t>
+            </a:r>
+            <a:r>
+              <a:rPr lang="de-DE" dirty="0"/>
+              <a:t> </a:t>
+            </a:r>
+            <a:endParaRPr lang="de-DE" u="sng" dirty="0">
+              <a:hlinkClick r:id="rId3"/>
+            </a:endParaRPr>
+          </a:p>
+          <a:p>
+            <a:pPr marL="0" indent="0">
+              <a:buNone/>
+            </a:pPr>
+            <a:r>
+              <a:rPr lang="de-DE" sz="2600" i="1" dirty="0" err="1"/>
+              <a:t>Replace</a:t>
+            </a:r>
+            <a:r>
+              <a:rPr lang="de-DE" sz="2600" i="1" dirty="0"/>
+              <a:t> </a:t>
+            </a:r>
+            <a:r>
+              <a:rPr lang="de-DE" sz="2600" i="1" dirty="0" err="1"/>
+              <a:t>with</a:t>
+            </a:r>
+            <a:r>
+              <a:rPr lang="de-DE" sz="2600" i="1" dirty="0"/>
+              <a:t>:</a:t>
+            </a:r>
+            <a:r>
+              <a:rPr lang="de-DE" sz="2600" i="1" u="sng" dirty="0"/>
+              <a:t> </a:t>
+            </a:r>
+            <a:r>
+              <a:rPr lang="de-DE" sz="2200" dirty="0">
+                <a:hlinkClick r:id="rId5"/>
+              </a:rPr>
+              <a:t>https://moryscarter.com/vespr/pavlovia.php?folder=</a:t>
+            </a:r>
+            <a:r>
+              <a:rPr lang="de-DE" sz="2200" dirty="0">
+                <a:solidFill>
+                  <a:srgbClr val="FF0000"/>
+                </a:solidFill>
+                <a:hlinkClick r:id="rId5"/>
+              </a:rPr>
+              <a:t>KarinBausenhart</a:t>
+            </a:r>
+            <a:r>
+              <a:rPr lang="de-DE" sz="2200" dirty="0">
+                <a:hlinkClick r:id="rId5"/>
+              </a:rPr>
+              <a:t>&amp;experiment=</a:t>
+            </a:r>
+            <a:r>
+              <a:rPr lang="de-DE" sz="2200" dirty="0">
+                <a:solidFill>
+                  <a:srgbClr val="FF0000"/>
+                </a:solidFill>
+                <a:hlinkClick r:id="rId5"/>
+              </a:rPr>
+              <a:t>iatexample/</a:t>
+            </a:r>
+            <a:endParaRPr lang="de-DE" sz="2200" dirty="0">
+              <a:solidFill>
+                <a:srgbClr val="FF0000"/>
+              </a:solidFill>
+            </a:endParaRPr>
+          </a:p>
+          <a:p>
+            <a:pPr marL="0" indent="0">
+              <a:buNone/>
+            </a:pPr>
+            <a:endParaRPr lang="de-DE" dirty="0">
+              <a:solidFill>
+                <a:srgbClr val="FF0000"/>
+              </a:solidFill>
+            </a:endParaRPr>
+          </a:p>
+          <a:p>
+            <a:pPr marL="0" indent="0">
+              <a:buNone/>
+            </a:pPr>
+            <a:r>
+              <a:rPr lang="fr-FR" b="1" dirty="0" err="1"/>
+              <a:t>Then</a:t>
+            </a:r>
+            <a:r>
+              <a:rPr lang="fr-FR" b="1" dirty="0"/>
+              <a:t> use participant </a:t>
+            </a:r>
+            <a:r>
+              <a:rPr lang="fr-FR" b="1" dirty="0" err="1"/>
+              <a:t>number</a:t>
+            </a:r>
+            <a:r>
+              <a:rPr lang="fr-FR" b="1" dirty="0"/>
+              <a:t> to </a:t>
+            </a:r>
+            <a:r>
+              <a:rPr lang="fr-FR" b="1" dirty="0" err="1"/>
+              <a:t>compute</a:t>
+            </a:r>
+            <a:r>
+              <a:rPr lang="fr-FR" b="1" dirty="0"/>
+              <a:t> </a:t>
+            </a:r>
+            <a:r>
+              <a:rPr lang="fr-FR" b="1" dirty="0" err="1"/>
+              <a:t>which</a:t>
+            </a:r>
+            <a:r>
+              <a:rPr lang="fr-FR" b="1" dirty="0"/>
+              <a:t> condition the participant </a:t>
+            </a:r>
+            <a:r>
+              <a:rPr lang="fr-FR" b="1" dirty="0" err="1"/>
+              <a:t>should</a:t>
+            </a:r>
+            <a:r>
+              <a:rPr lang="fr-FR" b="1" dirty="0"/>
+              <a:t> </a:t>
+            </a:r>
+            <a:r>
+              <a:rPr lang="fr-FR" b="1" dirty="0" err="1"/>
+              <a:t>be</a:t>
+            </a:r>
+            <a:r>
+              <a:rPr lang="fr-FR" b="1" dirty="0"/>
+              <a:t> in…</a:t>
+            </a:r>
+          </a:p>
+          <a:p>
+            <a:pPr marL="0" indent="0">
+              <a:buNone/>
+            </a:pPr>
+            <a:r>
+              <a:rPr lang="fr-FR" b="1" dirty="0"/>
+              <a:t>e.g.: condition = </a:t>
+            </a:r>
+            <a:r>
+              <a:rPr lang="fr-FR" b="1" dirty="0" err="1"/>
+              <a:t>int</a:t>
+            </a:r>
+            <a:r>
+              <a:rPr lang="fr-FR" b="1" dirty="0"/>
+              <a:t>(</a:t>
+            </a:r>
+            <a:r>
+              <a:rPr lang="fr-FR" b="1" dirty="0" err="1"/>
+              <a:t>expInfo</a:t>
+            </a:r>
+            <a:r>
+              <a:rPr lang="fr-FR" b="1" dirty="0"/>
+              <a:t>['participant'])%x</a:t>
+            </a:r>
+          </a:p>
+          <a:p>
+            <a:pPr marL="0" indent="0">
+              <a:buNone/>
+            </a:pPr>
+            <a:r>
+              <a:rPr lang="de-DE" dirty="0"/>
+              <a:t>(</a:t>
+            </a:r>
+            <a:r>
+              <a:rPr lang="de-DE" dirty="0" err="1"/>
+              <a:t>with</a:t>
+            </a:r>
+            <a:r>
+              <a:rPr lang="de-DE" dirty="0"/>
+              <a:t> x </a:t>
+            </a:r>
+            <a:r>
+              <a:rPr lang="de-DE" dirty="0" err="1"/>
+              <a:t>as</a:t>
+            </a:r>
+            <a:r>
+              <a:rPr lang="de-DE" dirty="0"/>
+              <a:t> </a:t>
+            </a:r>
+            <a:r>
+              <a:rPr lang="de-DE" dirty="0" err="1"/>
+              <a:t>the</a:t>
+            </a:r>
+            <a:r>
+              <a:rPr lang="de-DE" dirty="0"/>
+              <a:t> </a:t>
+            </a:r>
+            <a:r>
+              <a:rPr lang="de-DE" dirty="0" err="1"/>
+              <a:t>number</a:t>
+            </a:r>
+            <a:r>
+              <a:rPr lang="de-DE" dirty="0"/>
+              <a:t> </a:t>
+            </a:r>
+            <a:r>
+              <a:rPr lang="de-DE" dirty="0" err="1"/>
+              <a:t>of</a:t>
+            </a:r>
+            <a:r>
+              <a:rPr lang="de-DE" dirty="0"/>
+              <a:t> </a:t>
+            </a:r>
+            <a:r>
+              <a:rPr lang="de-DE" dirty="0" err="1"/>
+              <a:t>conditions</a:t>
+            </a:r>
+            <a:r>
+              <a:rPr lang="de-DE" dirty="0"/>
+              <a:t>), </a:t>
+            </a:r>
+            <a:r>
+              <a:rPr lang="de-DE" dirty="0" err="1"/>
+              <a:t>returns</a:t>
+            </a:r>
+            <a:r>
+              <a:rPr lang="de-DE" dirty="0"/>
+              <a:t> 0,1,…,x-1</a:t>
+            </a:r>
+          </a:p>
+        </p:txBody>
+      </p:sp>
+      <p:sp>
+        <p:nvSpPr>
+          <p:cNvPr id="4" name="Rechteck 3">
+            <a:extLst>
+              <a:ext uri="{FF2B5EF4-FFF2-40B4-BE49-F238E27FC236}">
+                <a16:creationId xmlns:a16="http://schemas.microsoft.com/office/drawing/2014/main" id="{F3F049F2-4C8B-4D8B-AE23-DE8010E4EDFB}"/>
+              </a:ext>
+            </a:extLst>
+          </p:cNvPr>
+          <p:cNvSpPr/>
+          <p:nvPr/>
+        </p:nvSpPr>
+        <p:spPr>
+          <a:xfrm>
+            <a:off x="5658929" y="3926455"/>
+            <a:ext cx="2441275" cy="388189"/>
+          </a:xfrm>
+          <a:prstGeom prst="rect">
+            <a:avLst/>
+          </a:prstGeom>
+          <a:noFill/>
+          <a:ln w="28575">
+            <a:solidFill>
+              <a:srgbClr val="FF0000"/>
+            </a:solidFill>
+          </a:ln>
+        </p:spPr>
+        <p:style>
+          <a:lnRef idx="2">
+            <a:schemeClr val="accent1">
+              <a:shade val="50000"/>
+            </a:schemeClr>
+          </a:lnRef>
+          <a:fillRef idx="1">
+            <a:schemeClr val="accent1"/>
+          </a:fillRef>
+          <a:effectRef idx="0">
+            <a:schemeClr val="accent1"/>
+          </a:effectRef>
+          <a:fontRef idx="minor">
+            <a:schemeClr val="lt1"/>
+          </a:fontRef>
+        </p:style>
+        <p:txBody>
+          <a:bodyPr rtlCol="0" anchor="ctr"/>
+          <a:lstStyle/>
+          <a:p>
+            <a:pPr algn="ctr"/>
+            <a:endParaRPr lang="de-DE"/>
+          </a:p>
+        </p:txBody>
+      </p:sp>
+      <p:sp>
+        <p:nvSpPr>
+          <p:cNvPr id="5" name="Rechteck 4">
+            <a:extLst>
+              <a:ext uri="{FF2B5EF4-FFF2-40B4-BE49-F238E27FC236}">
+                <a16:creationId xmlns:a16="http://schemas.microsoft.com/office/drawing/2014/main" id="{BE2D7248-FD01-4825-8EB1-DE7366624978}"/>
+              </a:ext>
+            </a:extLst>
+          </p:cNvPr>
+          <p:cNvSpPr/>
+          <p:nvPr/>
+        </p:nvSpPr>
+        <p:spPr>
+          <a:xfrm>
+            <a:off x="8266258" y="3897687"/>
+            <a:ext cx="2441275" cy="388189"/>
+          </a:xfrm>
+          <a:prstGeom prst="rect">
+            <a:avLst/>
+          </a:prstGeom>
+          <a:noFill/>
+          <a:ln w="28575">
+            <a:solidFill>
+              <a:srgbClr val="00B050"/>
+            </a:solidFill>
+          </a:ln>
+        </p:spPr>
+        <p:style>
+          <a:lnRef idx="2">
+            <a:schemeClr val="accent1">
+              <a:shade val="50000"/>
+            </a:schemeClr>
+          </a:lnRef>
+          <a:fillRef idx="1">
+            <a:schemeClr val="accent1"/>
+          </a:fillRef>
+          <a:effectRef idx="0">
+            <a:schemeClr val="accent1"/>
+          </a:effectRef>
+          <a:fontRef idx="minor">
+            <a:schemeClr val="lt1"/>
+          </a:fontRef>
+        </p:style>
+        <p:txBody>
+          <a:bodyPr rtlCol="0" anchor="ctr"/>
+          <a:lstStyle/>
+          <a:p>
+            <a:pPr algn="ctr"/>
+            <a:endParaRPr lang="de-DE"/>
+          </a:p>
+        </p:txBody>
+      </p:sp>
+      <p:sp>
+        <p:nvSpPr>
+          <p:cNvPr id="6" name="Rechteck 5">
+            <a:extLst>
+              <a:ext uri="{FF2B5EF4-FFF2-40B4-BE49-F238E27FC236}">
+                <a16:creationId xmlns:a16="http://schemas.microsoft.com/office/drawing/2014/main" id="{22F889F3-CFD2-480B-8FF1-6C2864BD8429}"/>
+              </a:ext>
+            </a:extLst>
+          </p:cNvPr>
+          <p:cNvSpPr/>
+          <p:nvPr/>
+        </p:nvSpPr>
+        <p:spPr>
+          <a:xfrm>
+            <a:off x="10721187" y="3890510"/>
+            <a:ext cx="152400" cy="388189"/>
+          </a:xfrm>
+          <a:prstGeom prst="rect">
+            <a:avLst/>
+          </a:prstGeom>
+          <a:noFill/>
+          <a:ln w="28575">
+            <a:solidFill>
+              <a:srgbClr val="0070C0"/>
+            </a:solidFill>
+          </a:ln>
+        </p:spPr>
+        <p:style>
+          <a:lnRef idx="2">
+            <a:schemeClr val="accent1">
+              <a:shade val="50000"/>
+            </a:schemeClr>
+          </a:lnRef>
+          <a:fillRef idx="1">
+            <a:schemeClr val="accent1"/>
+          </a:fillRef>
+          <a:effectRef idx="0">
+            <a:schemeClr val="accent1"/>
+          </a:effectRef>
+          <a:fontRef idx="minor">
+            <a:schemeClr val="lt1"/>
+          </a:fontRef>
+        </p:style>
+        <p:txBody>
+          <a:bodyPr rtlCol="0" anchor="ctr"/>
+          <a:lstStyle/>
+          <a:p>
+            <a:pPr algn="ctr"/>
+            <a:endParaRPr lang="de-DE"/>
+          </a:p>
+        </p:txBody>
+      </p:sp>
+    </p:spTree>
+    <p:extLst>
+      <p:ext uri="{BB962C8B-B14F-4D97-AF65-F5344CB8AC3E}">
+        <p14:creationId xmlns:p14="http://schemas.microsoft.com/office/powerpoint/2010/main" val="2786118976"/>
       </p:ext>
     </p:extLst>
   </p:cSld>

</xml_diff>